<commit_message>
Add slide about PHP arrays
</commit_message>
<xml_diff>
--- a/slides/Pingo - PHP Basics - Statements.pptx
+++ b/slides/Pingo - PHP Basics - Statements.pptx
@@ -9909,7 +9909,88 @@
                 </a:effectLst>
                 <a:ea typeface="+mn-ea"/>
               </a:rPr>
-              <a:t>    echo "var2 is bigger than var1";</a:t>
+              <a:t>    echo "var2 is bigger than </a:t>
+            </a:r>
+            <a:r>
+              <a:rPr lang="en-US" sz="2600" dirty="0" smtClean="0">
+                <a:ln w="12700">
+                  <a:solidFill>
+                    <a:schemeClr val="tx2">
+                      <a:satMod val="155000"/>
+                    </a:schemeClr>
+                  </a:solidFill>
+                  <a:prstDash val="solid"/>
+                </a:ln>
+                <a:solidFill>
+                  <a:schemeClr val="bg2">
+                    <a:tint val="85000"/>
+                    <a:satMod val="155000"/>
+                  </a:schemeClr>
+                </a:solidFill>
+                <a:effectLst>
+                  <a:outerShdw blurRad="41275" dist="20320" dir="1800000" algn="tl" rotWithShape="0">
+                    <a:srgbClr val="000000">
+                      <a:alpha val="40000"/>
+                    </a:srgbClr>
+                  </a:outerShdw>
+                </a:effectLst>
+                <a:ea typeface="+mn-ea"/>
+              </a:rPr>
+              <a:t>or equal to </a:t>
+            </a:r>
+            <a:r>
+              <a:rPr lang="en-US" sz="2600" dirty="0" smtClean="0">
+                <a:ln w="12700">
+                  <a:solidFill>
+                    <a:schemeClr val="tx2">
+                      <a:satMod val="155000"/>
+                    </a:schemeClr>
+                  </a:solidFill>
+                  <a:prstDash val="solid"/>
+                </a:ln>
+                <a:solidFill>
+                  <a:schemeClr val="bg2">
+                    <a:tint val="85000"/>
+                    <a:satMod val="155000"/>
+                  </a:schemeClr>
+                </a:solidFill>
+                <a:effectLst>
+                  <a:outerShdw blurRad="41275" dist="20320" dir="1800000" algn="tl" rotWithShape="0">
+                    <a:srgbClr val="000000">
+                      <a:alpha val="40000"/>
+                    </a:srgbClr>
+                  </a:outerShdw>
+                </a:effectLst>
+                <a:ea typeface="+mn-ea"/>
+              </a:rPr>
+              <a:t>var1</a:t>
+            </a:r>
+            <a:r>
+              <a:rPr lang="en-US" sz="2600" dirty="0">
+                <a:ln w="12700">
+                  <a:solidFill>
+                    <a:schemeClr val="tx2">
+                      <a:satMod val="155000"/>
+                    </a:schemeClr>
+                  </a:solidFill>
+                  <a:prstDash val="solid"/>
+                </a:ln>
+                <a:solidFill>
+                  <a:schemeClr val="bg2">
+                    <a:tint val="85000"/>
+                    <a:satMod val="155000"/>
+                  </a:schemeClr>
+                </a:solidFill>
+                <a:effectLst>
+                  <a:outerShdw blurRad="41275" dist="20320" dir="1800000" algn="tl" rotWithShape="0">
+                    <a:srgbClr val="000000">
+                      <a:alpha val="40000"/>
+                    </a:srgbClr>
+                  </a:outerShdw>
+                </a:effectLst>
+                <a:ea typeface="+mn-ea"/>
+              </a:rPr>
+              <a:t>";</a:t>
             </a:r>
           </a:p>
           <a:p>
@@ -11998,8 +12079,59 @@
                 </a:effectLst>
                 <a:ea typeface="+mn-ea"/>
               </a:rPr>
-              <a:t>	// Statements</a:t>
-            </a:r>
+              <a:t>	// </a:t>
+            </a:r>
+            <a:r>
+              <a:rPr lang="en-US" sz="2400" dirty="0" smtClean="0">
+                <a:ln w="12700">
+                  <a:solidFill>
+                    <a:schemeClr val="tx2">
+                      <a:satMod val="155000"/>
+                    </a:schemeClr>
+                  </a:solidFill>
+                  <a:prstDash val="solid"/>
+                </a:ln>
+                <a:solidFill>
+                  <a:schemeClr val="bg2">
+                    <a:tint val="85000"/>
+                    <a:satMod val="155000"/>
+                  </a:schemeClr>
+                </a:solidFill>
+                <a:effectLst>
+                  <a:outerShdw blurRad="41275" dist="20320" dir="1800000" algn="tl" rotWithShape="0">
+                    <a:srgbClr val="000000">
+                      <a:alpha val="40000"/>
+                    </a:srgbClr>
+                  </a:outerShdw>
+                </a:effectLst>
+                <a:ea typeface="+mn-ea"/>
+              </a:rPr>
+              <a:t>Statements 0</a:t>
+            </a:r>
+            <a:endParaRPr lang="en-US" sz="2400" dirty="0" smtClean="0">
+              <a:ln w="12700">
+                <a:solidFill>
+                  <a:schemeClr val="tx2">
+                    <a:satMod val="155000"/>
+                  </a:schemeClr>
+                </a:solidFill>
+                <a:prstDash val="solid"/>
+              </a:ln>
+              <a:solidFill>
+                <a:schemeClr val="bg2">
+                  <a:tint val="85000"/>
+                  <a:satMod val="155000"/>
+                </a:schemeClr>
+              </a:solidFill>
+              <a:effectLst>
+                <a:outerShdw blurRad="41275" dist="20320" dir="1800000" algn="tl" rotWithShape="0">
+                  <a:srgbClr val="000000">
+                    <a:alpha val="40000"/>
+                  </a:srgbClr>
+                </a:outerShdw>
+              </a:effectLst>
+              <a:ea typeface="+mn-ea"/>
+            </a:endParaRPr>
           </a:p>
           <a:p>
             <a:pPr marL="357188" lvl="1" indent="0" eaLnBrk="1" hangingPunct="1">
@@ -12120,8 +12252,59 @@
                 </a:effectLst>
                 <a:ea typeface="+mn-ea"/>
               </a:rPr>
-              <a:t>	// Statements</a:t>
-            </a:r>
+              <a:t>	// </a:t>
+            </a:r>
+            <a:r>
+              <a:rPr lang="en-US" sz="2400" dirty="0" smtClean="0">
+                <a:ln w="12700">
+                  <a:solidFill>
+                    <a:schemeClr val="tx2">
+                      <a:satMod val="155000"/>
+                    </a:schemeClr>
+                  </a:solidFill>
+                  <a:prstDash val="solid"/>
+                </a:ln>
+                <a:solidFill>
+                  <a:schemeClr val="bg2">
+                    <a:tint val="85000"/>
+                    <a:satMod val="155000"/>
+                  </a:schemeClr>
+                </a:solidFill>
+                <a:effectLst>
+                  <a:outerShdw blurRad="41275" dist="20320" dir="1800000" algn="tl" rotWithShape="0">
+                    <a:srgbClr val="000000">
+                      <a:alpha val="40000"/>
+                    </a:srgbClr>
+                  </a:outerShdw>
+                </a:effectLst>
+                <a:ea typeface="+mn-ea"/>
+              </a:rPr>
+              <a:t>Statements 1</a:t>
+            </a:r>
+            <a:endParaRPr lang="en-US" sz="2400" dirty="0" smtClean="0">
+              <a:ln w="12700">
+                <a:solidFill>
+                  <a:schemeClr val="tx2">
+                    <a:satMod val="155000"/>
+                  </a:schemeClr>
+                </a:solidFill>
+                <a:prstDash val="solid"/>
+              </a:ln>
+              <a:solidFill>
+                <a:schemeClr val="bg2">
+                  <a:tint val="85000"/>
+                  <a:satMod val="155000"/>
+                </a:schemeClr>
+              </a:solidFill>
+              <a:effectLst>
+                <a:outerShdw blurRad="41275" dist="20320" dir="1800000" algn="tl" rotWithShape="0">
+                  <a:srgbClr val="000000">
+                    <a:alpha val="40000"/>
+                  </a:srgbClr>
+                </a:outerShdw>
+              </a:effectLst>
+              <a:ea typeface="+mn-ea"/>
+            </a:endParaRPr>
           </a:p>
           <a:p>
             <a:pPr marL="357188" lvl="1" indent="0" eaLnBrk="1" hangingPunct="1">
@@ -12276,8 +12459,59 @@
                 </a:effectLst>
                 <a:ea typeface="+mn-ea"/>
               </a:rPr>
-              <a:t>	// Statements</a:t>
-            </a:r>
+              <a:t>	// </a:t>
+            </a:r>
+            <a:r>
+              <a:rPr lang="en-US" sz="2400" dirty="0" smtClean="0">
+                <a:ln w="12700">
+                  <a:solidFill>
+                    <a:schemeClr val="tx2">
+                      <a:satMod val="155000"/>
+                    </a:schemeClr>
+                  </a:solidFill>
+                  <a:prstDash val="solid"/>
+                </a:ln>
+                <a:solidFill>
+                  <a:schemeClr val="bg2">
+                    <a:tint val="85000"/>
+                    <a:satMod val="155000"/>
+                  </a:schemeClr>
+                </a:solidFill>
+                <a:effectLst>
+                  <a:outerShdw blurRad="41275" dist="20320" dir="1800000" algn="tl" rotWithShape="0">
+                    <a:srgbClr val="000000">
+                      <a:alpha val="40000"/>
+                    </a:srgbClr>
+                  </a:outerShdw>
+                </a:effectLst>
+                <a:ea typeface="+mn-ea"/>
+              </a:rPr>
+              <a:t>Statements n</a:t>
+            </a:r>
+            <a:endParaRPr lang="en-US" sz="2400" dirty="0" smtClean="0">
+              <a:ln w="12700">
+                <a:solidFill>
+                  <a:schemeClr val="tx2">
+                    <a:satMod val="155000"/>
+                  </a:schemeClr>
+                </a:solidFill>
+                <a:prstDash val="solid"/>
+              </a:ln>
+              <a:solidFill>
+                <a:schemeClr val="bg2">
+                  <a:tint val="85000"/>
+                  <a:satMod val="155000"/>
+                </a:schemeClr>
+              </a:solidFill>
+              <a:effectLst>
+                <a:outerShdw blurRad="41275" dist="20320" dir="1800000" algn="tl" rotWithShape="0">
+                  <a:srgbClr val="000000">
+                    <a:alpha val="40000"/>
+                  </a:srgbClr>
+                </a:outerShdw>
+              </a:effectLst>
+              <a:ea typeface="+mn-ea"/>
+            </a:endParaRPr>
           </a:p>
           <a:p>
             <a:pPr marL="357188" lvl="1" indent="0" eaLnBrk="1" hangingPunct="1">
@@ -12398,8 +12632,59 @@
                 </a:effectLst>
                 <a:ea typeface="+mn-ea"/>
               </a:rPr>
-              <a:t>	// Statements</a:t>
-            </a:r>
+              <a:t>	// </a:t>
+            </a:r>
+            <a:r>
+              <a:rPr lang="en-US" sz="2400" dirty="0" smtClean="0">
+                <a:ln w="12700">
+                  <a:solidFill>
+                    <a:schemeClr val="tx2">
+                      <a:satMod val="155000"/>
+                    </a:schemeClr>
+                  </a:solidFill>
+                  <a:prstDash val="solid"/>
+                </a:ln>
+                <a:solidFill>
+                  <a:schemeClr val="bg2">
+                    <a:tint val="85000"/>
+                    <a:satMod val="155000"/>
+                  </a:schemeClr>
+                </a:solidFill>
+                <a:effectLst>
+                  <a:outerShdw blurRad="41275" dist="20320" dir="1800000" algn="tl" rotWithShape="0">
+                    <a:srgbClr val="000000">
+                      <a:alpha val="40000"/>
+                    </a:srgbClr>
+                  </a:outerShdw>
+                </a:effectLst>
+                <a:ea typeface="+mn-ea"/>
+              </a:rPr>
+              <a:t>Statements default</a:t>
+            </a:r>
+            <a:endParaRPr lang="en-US" sz="2400" dirty="0" smtClean="0">
+              <a:ln w="12700">
+                <a:solidFill>
+                  <a:schemeClr val="tx2">
+                    <a:satMod val="155000"/>
+                  </a:schemeClr>
+                </a:solidFill>
+                <a:prstDash val="solid"/>
+              </a:ln>
+              <a:solidFill>
+                <a:schemeClr val="bg2">
+                  <a:tint val="85000"/>
+                  <a:satMod val="155000"/>
+                </a:schemeClr>
+              </a:solidFill>
+              <a:effectLst>
+                <a:outerShdw blurRad="41275" dist="20320" dir="1800000" algn="tl" rotWithShape="0">
+                  <a:srgbClr val="000000">
+                    <a:alpha val="40000"/>
+                  </a:srgbClr>
+                </a:outerShdw>
+              </a:effectLst>
+              <a:ea typeface="+mn-ea"/>
+            </a:endParaRPr>
           </a:p>
           <a:p>
             <a:pPr marL="357188" lvl="1" indent="0" eaLnBrk="1" hangingPunct="1">
@@ -22111,8 +22396,113 @@
                 </a:effectLst>
                 <a:ea typeface="+mn-ea"/>
               </a:rPr>
-              <a:t>$var1 = 1;</a:t>
-            </a:r>
+              <a:t>$var1 = </a:t>
+            </a:r>
+            <a:r>
+              <a:rPr lang="en-US" sz="2600" dirty="0" smtClean="0">
+                <a:ln w="12700">
+                  <a:solidFill>
+                    <a:schemeClr val="tx2">
+                      <a:satMod val="155000"/>
+                    </a:schemeClr>
+                  </a:solidFill>
+                  <a:prstDash val="solid"/>
+                </a:ln>
+                <a:solidFill>
+                  <a:schemeClr val="bg2">
+                    <a:tint val="85000"/>
+                    <a:satMod val="155000"/>
+                  </a:schemeClr>
+                </a:solidFill>
+                <a:effectLst>
+                  <a:outerShdw blurRad="41275" dist="20320" dir="1800000" algn="tl" rotWithShape="0">
+                    <a:srgbClr val="000000">
+                      <a:alpha val="40000"/>
+                    </a:srgbClr>
+                  </a:outerShdw>
+                </a:effectLst>
+                <a:ea typeface="+mn-ea"/>
+              </a:rPr>
+              <a:t>1</a:t>
+            </a:r>
+            <a:r>
+              <a:rPr lang="en-US" sz="2600" dirty="0" smtClean="0">
+                <a:ln w="12700">
+                  <a:solidFill>
+                    <a:schemeClr val="tx2">
+                      <a:satMod val="155000"/>
+                    </a:schemeClr>
+                  </a:solidFill>
+                  <a:prstDash val="solid"/>
+                </a:ln>
+                <a:solidFill>
+                  <a:schemeClr val="bg2">
+                    <a:tint val="85000"/>
+                    <a:satMod val="155000"/>
+                  </a:schemeClr>
+                </a:solidFill>
+                <a:effectLst>
+                  <a:outerShdw blurRad="41275" dist="20320" dir="1800000" algn="tl" rotWithShape="0">
+                    <a:srgbClr val="000000">
+                      <a:alpha val="40000"/>
+                    </a:srgbClr>
+                  </a:outerShdw>
+                </a:effectLst>
+                <a:ea typeface="+mn-ea"/>
+              </a:rPr>
+              <a:t>0</a:t>
+            </a:r>
+            <a:r>
+              <a:rPr lang="en-US" sz="2600" dirty="0" smtClean="0">
+                <a:ln w="12700">
+                  <a:solidFill>
+                    <a:schemeClr val="tx2">
+                      <a:satMod val="155000"/>
+                    </a:schemeClr>
+                  </a:solidFill>
+                  <a:prstDash val="solid"/>
+                </a:ln>
+                <a:solidFill>
+                  <a:schemeClr val="bg2">
+                    <a:tint val="85000"/>
+                    <a:satMod val="155000"/>
+                  </a:schemeClr>
+                </a:solidFill>
+                <a:effectLst>
+                  <a:outerShdw blurRad="41275" dist="20320" dir="1800000" algn="tl" rotWithShape="0">
+                    <a:srgbClr val="000000">
+                      <a:alpha val="40000"/>
+                    </a:srgbClr>
+                  </a:outerShdw>
+                </a:effectLst>
+                <a:ea typeface="+mn-ea"/>
+              </a:rPr>
+              <a:t>;</a:t>
+            </a:r>
+            <a:endParaRPr lang="en-US" sz="2600" dirty="0" smtClean="0">
+              <a:ln w="12700">
+                <a:solidFill>
+                  <a:schemeClr val="tx2">
+                    <a:satMod val="155000"/>
+                  </a:schemeClr>
+                </a:solidFill>
+                <a:prstDash val="solid"/>
+              </a:ln>
+              <a:solidFill>
+                <a:schemeClr val="bg2">
+                  <a:tint val="85000"/>
+                  <a:satMod val="155000"/>
+                </a:schemeClr>
+              </a:solidFill>
+              <a:effectLst>
+                <a:outerShdw blurRad="41275" dist="20320" dir="1800000" algn="tl" rotWithShape="0">
+                  <a:srgbClr val="000000">
+                    <a:alpha val="40000"/>
+                  </a:srgbClr>
+                </a:outerShdw>
+              </a:effectLst>
+              <a:ea typeface="+mn-ea"/>
+            </a:endParaRPr>
           </a:p>
           <a:p>
             <a:pPr marL="357188" lvl="1" indent="0" eaLnBrk="1" hangingPunct="1">
@@ -22172,8 +22562,59 @@
                 </a:effectLst>
                 <a:ea typeface="+mn-ea"/>
               </a:rPr>
-              <a:t>var2 = 10;</a:t>
-            </a:r>
+              <a:t>var2 = </a:t>
+            </a:r>
+            <a:r>
+              <a:rPr lang="en-US" sz="2600" dirty="0" smtClean="0">
+                <a:ln w="12700">
+                  <a:solidFill>
+                    <a:schemeClr val="tx2">
+                      <a:satMod val="155000"/>
+                    </a:schemeClr>
+                  </a:solidFill>
+                  <a:prstDash val="solid"/>
+                </a:ln>
+                <a:solidFill>
+                  <a:schemeClr val="bg2">
+                    <a:tint val="85000"/>
+                    <a:satMod val="155000"/>
+                  </a:schemeClr>
+                </a:solidFill>
+                <a:effectLst>
+                  <a:outerShdw blurRad="41275" dist="20320" dir="1800000" algn="tl" rotWithShape="0">
+                    <a:srgbClr val="000000">
+                      <a:alpha val="40000"/>
+                    </a:srgbClr>
+                  </a:outerShdw>
+                </a:effectLst>
+                <a:ea typeface="+mn-ea"/>
+              </a:rPr>
+              <a:t>1;</a:t>
+            </a:r>
+            <a:endParaRPr lang="en-US" sz="2600" dirty="0">
+              <a:ln w="12700">
+                <a:solidFill>
+                  <a:schemeClr val="tx2">
+                    <a:satMod val="155000"/>
+                  </a:schemeClr>
+                </a:solidFill>
+                <a:prstDash val="solid"/>
+              </a:ln>
+              <a:solidFill>
+                <a:schemeClr val="bg2">
+                  <a:tint val="85000"/>
+                  <a:satMod val="155000"/>
+                </a:schemeClr>
+              </a:solidFill>
+              <a:effectLst>
+                <a:outerShdw blurRad="41275" dist="20320" dir="1800000" algn="tl" rotWithShape="0">
+                  <a:srgbClr val="000000">
+                    <a:alpha val="40000"/>
+                  </a:srgbClr>
+                </a:outerShdw>
+              </a:effectLst>
+              <a:ea typeface="+mn-ea"/>
+            </a:endParaRPr>
           </a:p>
           <a:p>
             <a:pPr marL="357188" lvl="1" indent="0" eaLnBrk="1" hangingPunct="1">

</xml_diff>